<commit_message>
Some more proposed changes modified
</commit_message>
<xml_diff>
--- a/doc/mclone-sw-structure.pptx
+++ b/doc/mclone-sw-structure.pptx
@@ -53,49 +53,14 @@
       </p:grpSpPr>
       <p:sp>
         <p:nvSpPr>
-          <p:cNvPr id="0" name="PlaceHolder 1"/>
-          <p:cNvSpPr>
-            <a:spLocks noGrp="1"/>
-          </p:cNvSpPr>
-          <p:nvPr>
-            <p:ph type="dt"/>
-          </p:nvPr>
-        </p:nvSpPr>
-        <p:spPr>
-          <a:xfrm>
-            <a:off x="457200" y="6356520"/>
-            <a:ext cx="2133360" cy="364680"/>
-          </a:xfrm>
-          <a:prstGeom prst="rect">
-            <a:avLst/>
-          </a:prstGeom>
-        </p:spPr>
-        <p:txBody>
-          <a:bodyPr anchor="ctr"/>
-          <a:p>
-            <a:r>
-              <a:rPr lang="pt-BR" sz="1200">
-                <a:solidFill>
-                  <a:srgbClr val="8b8b8b"/>
-                </a:solidFill>
-                <a:latin typeface="Calibri"/>
-              </a:rPr>
-              <a:t>27/05/11</a:t>
-            </a:r>
-            <a:endParaRPr/>
-          </a:p>
-        </p:txBody>
-      </p:sp>
-      <p:sp>
-        <p:nvSpPr>
-          <p:cNvPr id="1" name="TextShape 2"/>
-          <p:cNvSpPr txBox="1"/>
+          <p:cNvPr id="0" name="CustomShape 1"/>
+          <p:cNvSpPr/>
           <p:nvPr/>
         </p:nvSpPr>
         <p:spPr>
           <a:xfrm>
             <a:off x="3124080" y="6356520"/>
-            <a:ext cx="2895120" cy="364680"/>
+            <a:ext cx="2894760" cy="364320"/>
           </a:xfrm>
           <a:prstGeom prst="rect">
             <a:avLst/>
@@ -104,42 +69,7 @@
       </p:sp>
       <p:sp>
         <p:nvSpPr>
-          <p:cNvPr id="2" name="PlaceHolder 3"/>
-          <p:cNvSpPr>
-            <a:spLocks noGrp="1"/>
-          </p:cNvSpPr>
-          <p:nvPr>
-            <p:ph type="sldNum"/>
-          </p:nvPr>
-        </p:nvSpPr>
-        <p:spPr>
-          <a:xfrm>
-            <a:off x="6553080" y="6356520"/>
-            <a:ext cx="2133360" cy="364680"/>
-          </a:xfrm>
-          <a:prstGeom prst="rect">
-            <a:avLst/>
-          </a:prstGeom>
-        </p:spPr>
-        <p:txBody>
-          <a:bodyPr anchor="ctr"/>
-          <a:p>
-            <a:fld id="{C1B131A1-41E1-4111-B141-217181813131}" type="slidenum">
-              <a:rPr lang="pt-BR" sz="1200">
-                <a:solidFill>
-                  <a:srgbClr val="8b8b8b"/>
-                </a:solidFill>
-                <a:latin typeface="Calibri"/>
-              </a:rPr>
-              <a:t>&lt;número&gt;</a:t>
-            </a:fld>
-            <a:endParaRPr/>
-          </a:p>
-        </p:txBody>
-      </p:sp>
-      <p:sp>
-        <p:nvSpPr>
-          <p:cNvPr id="3" name="PlaceHolder 4"/>
+          <p:cNvPr id="1" name="PlaceHolder 2"/>
           <p:cNvSpPr>
             <a:spLocks noGrp="1"/>
           </p:cNvSpPr>
@@ -159,8 +89,9 @@
         <p:txBody>
           <a:bodyPr anchor="ctr" bIns="0" lIns="0" rIns="0" tIns="0" wrap="none"/>
           <a:p>
-            <a:r>
-              <a:rPr lang="en-US"/>
+            <a:pPr algn="ctr"/>
+            <a:r>
+              <a:rPr lang="pt-BR"/>
               <a:t>Clique para editar o formato do texto do título</a:t>
             </a:r>
             <a:endParaRPr/>
@@ -169,7 +100,7 @@
       </p:sp>
       <p:sp>
         <p:nvSpPr>
-          <p:cNvPr id="4" name="PlaceHolder 5"/>
+          <p:cNvPr id="2" name="PlaceHolder 3"/>
           <p:cNvSpPr>
             <a:spLocks noGrp="1"/>
           </p:cNvSpPr>
@@ -195,7 +126,7 @@
               <a:buChar char=""/>
             </a:pPr>
             <a:r>
-              <a:rPr lang="en-US"/>
+              <a:rPr lang="pt-BR"/>
               <a:t>Clique para editar o formato do texto da estrutura de tópicos</a:t>
             </a:r>
             <a:endParaRPr/>
@@ -207,7 +138,7 @@
               <a:buChar char=""/>
             </a:pPr>
             <a:r>
-              <a:rPr lang="en-US"/>
+              <a:rPr lang="pt-BR"/>
               <a:t>2.º Nível da estrutura de tópicos</a:t>
             </a:r>
             <a:endParaRPr/>
@@ -219,7 +150,7 @@
               <a:buChar char=""/>
             </a:pPr>
             <a:r>
-              <a:rPr lang="en-US"/>
+              <a:rPr lang="pt-BR"/>
               <a:t>3.º Nível da estrutura de tópicos</a:t>
             </a:r>
             <a:endParaRPr/>
@@ -231,7 +162,7 @@
               <a:buChar char=""/>
             </a:pPr>
             <a:r>
-              <a:rPr lang="en-US"/>
+              <a:rPr lang="pt-BR"/>
               <a:t>4.º Nível da estrutura de tópicos</a:t>
             </a:r>
             <a:endParaRPr/>
@@ -243,7 +174,7 @@
               <a:buChar char=""/>
             </a:pPr>
             <a:r>
-              <a:rPr lang="en-US"/>
+              <a:rPr lang="pt-BR"/>
               <a:t>5.º Nível da estrutura de tópicos</a:t>
             </a:r>
             <a:endParaRPr/>
@@ -255,7 +186,7 @@
               <a:buChar char=""/>
             </a:pPr>
             <a:r>
-              <a:rPr lang="en-US"/>
+              <a:rPr lang="pt-BR"/>
               <a:t>6.º Nível da estrutura de tópicos</a:t>
             </a:r>
             <a:endParaRPr/>
@@ -267,7 +198,7 @@
               <a:buChar char=""/>
             </a:pPr>
             <a:r>
-              <a:rPr lang="en-US"/>
+              <a:rPr lang="pt-BR"/>
               <a:t>7.º Nível da estrutura de tópicos</a:t>
             </a:r>
             <a:endParaRPr/>
@@ -279,7 +210,7 @@
               <a:buChar char=""/>
             </a:pPr>
             <a:r>
-              <a:rPr lang="en-US"/>
+              <a:rPr lang="pt-BR"/>
               <a:t>8.º Nível da estrutura de tópicos</a:t>
             </a:r>
             <a:endParaRPr/>
@@ -291,7 +222,7 @@
               <a:buChar char=""/>
             </a:pPr>
             <a:r>
-              <a:rPr lang="en-US"/>
+              <a:rPr lang="pt-BR"/>
               <a:t>9.º Nível da estrutura de tópicos</a:t>
             </a:r>
             <a:endParaRPr/>
@@ -326,14 +257,14 @@
       </p:grpSpPr>
       <p:sp>
         <p:nvSpPr>
-          <p:cNvPr id="5" name="CustomShape 1"/>
+          <p:cNvPr id="3" name="CustomShape 1"/>
           <p:cNvSpPr/>
           <p:nvPr/>
         </p:nvSpPr>
         <p:spPr>
           <a:xfrm>
             <a:off x="2852280" y="224280"/>
-            <a:ext cx="2873880" cy="5636160"/>
+            <a:ext cx="2873520" cy="5355720"/>
           </a:xfrm>
           <a:prstGeom prst="rect">
             <a:avLst/>
@@ -378,18 +309,6 @@
                 </a:solidFill>
                 <a:latin typeface="Calibri"/>
               </a:rPr>
-              <a:t>decompLU</a:t>
-            </a:r>
-            <a:endParaRPr/>
-          </a:p>
-          <a:p>
-            <a:r>
-              <a:rPr lang="pt-BR" sz="2800">
-                <a:solidFill>
-                  <a:srgbClr val="000000"/>
-                </a:solidFill>
-                <a:latin typeface="Calibri"/>
-              </a:rPr>
               <a:t>distpoints</a:t>
             </a:r>
             <a:endParaRPr/>
@@ -450,7 +369,7 @@
                 </a:solidFill>
                 <a:latin typeface="Calibri"/>
               </a:rPr>
-              <a:t>nrutil</a:t>
+              <a:t>matrixUtil</a:t>
             </a:r>
             <a:endParaRPr/>
           </a:p>
@@ -498,7 +417,7 @@
                 </a:solidFill>
                 <a:latin typeface="Calibri"/>
               </a:rPr>
-              <a:t>InterfaceVoronoi</a:t>
+              <a:t>interfaceVoronoi</a:t>
             </a:r>
             <a:endParaRPr/>
           </a:p>
@@ -518,14 +437,14 @@
       </p:sp>
       <p:sp>
         <p:nvSpPr>
-          <p:cNvPr id="6" name="CustomShape 2"/>
+          <p:cNvPr id="4" name="CustomShape 2"/>
           <p:cNvSpPr/>
           <p:nvPr/>
         </p:nvSpPr>
         <p:spPr>
           <a:xfrm>
             <a:off x="112680" y="224280"/>
-            <a:ext cx="2406960" cy="2924280"/>
+            <a:ext cx="2406600" cy="2923920"/>
           </a:xfrm>
           <a:prstGeom prst="rect">
             <a:avLst/>
@@ -629,14 +548,14 @@
       </p:sp>
       <p:sp>
         <p:nvSpPr>
-          <p:cNvPr id="7" name="CustomShape 3"/>
+          <p:cNvPr id="5" name="CustomShape 3"/>
           <p:cNvSpPr/>
           <p:nvPr/>
         </p:nvSpPr>
         <p:spPr>
           <a:xfrm>
             <a:off x="112680" y="3495960"/>
-            <a:ext cx="2653200" cy="2497680"/>
+            <a:ext cx="2652840" cy="2497320"/>
           </a:xfrm>
           <a:prstGeom prst="rect">
             <a:avLst/>
@@ -728,14 +647,14 @@
       </p:sp>
       <p:sp>
         <p:nvSpPr>
-          <p:cNvPr id="8" name="CustomShape 4"/>
+          <p:cNvPr id="6" name="CustomShape 4"/>
           <p:cNvSpPr/>
           <p:nvPr/>
         </p:nvSpPr>
         <p:spPr>
           <a:xfrm>
             <a:off x="5925960" y="224280"/>
-            <a:ext cx="2869200" cy="4630680"/>
+            <a:ext cx="2868840" cy="4630320"/>
           </a:xfrm>
           <a:prstGeom prst="rect">
             <a:avLst/>
@@ -804,19 +723,19 @@
                 </a:solidFill>
                 <a:latin typeface="Calibri"/>
               </a:rPr>
-              <a:t>readInpFile</a:t>
-            </a:r>
-            <a:endParaRPr/>
-          </a:p>
-          <a:p>
-            <a:r>
-              <a:rPr lang="pt-BR" sz="2800">
-                <a:solidFill>
-                  <a:srgbClr val="ff0000"/>
-                </a:solidFill>
-                <a:latin typeface="Calibri"/>
-              </a:rPr>
-              <a:t>patternObj-&gt;obj.c</a:t>
+              <a:t>Object</a:t>
+            </a:r>
+            <a:endParaRPr/>
+          </a:p>
+          <a:p>
+            <a:r>
+              <a:rPr lang="pt-BR" sz="2800">
+                <a:solidFill>
+                  <a:srgbClr val="000000"/>
+                </a:solidFill>
+                <a:latin typeface="Calibri"/>
+              </a:rPr>
+              <a:t>PatternObject</a:t>
             </a:r>
             <a:endParaRPr/>
           </a:p>
@@ -875,14 +794,14 @@
       </p:sp>
       <p:sp>
         <p:nvSpPr>
-          <p:cNvPr id="9" name="CustomShape 5"/>
+          <p:cNvPr id="7" name="CustomShape 5"/>
           <p:cNvSpPr/>
           <p:nvPr/>
         </p:nvSpPr>
         <p:spPr>
           <a:xfrm>
             <a:off x="3060000" y="5976000"/>
-            <a:ext cx="2406960" cy="791280"/>
+            <a:ext cx="2406600" cy="790920"/>
           </a:xfrm>
           <a:prstGeom prst="rect">
             <a:avLst/>
@@ -926,14 +845,14 @@
       </p:sp>
       <p:sp>
         <p:nvSpPr>
-          <p:cNvPr id="10" name="CustomShape 6"/>
+          <p:cNvPr id="8" name="CustomShape 6"/>
           <p:cNvSpPr/>
           <p:nvPr/>
         </p:nvSpPr>
         <p:spPr>
           <a:xfrm>
             <a:off x="6053040" y="5040000"/>
-            <a:ext cx="2406960" cy="1644480"/>
+            <a:ext cx="2406600" cy="1644120"/>
           </a:xfrm>
           <a:prstGeom prst="rect">
             <a:avLst/>

</xml_diff>

<commit_message>
Partial cleaning genericUtil.c and created Growth.c and Anim.c
</commit_message>
<xml_diff>
--- a/doc/mclone-sw-structure.pptx
+++ b/doc/mclone-sw-structure.pptx
@@ -60,7 +60,7 @@
         <p:spPr>
           <a:xfrm>
             <a:off x="3124080" y="6356520"/>
-            <a:ext cx="2894760" cy="364320"/>
+            <a:ext cx="2894040" cy="363600"/>
           </a:xfrm>
           <a:prstGeom prst="rect">
             <a:avLst/>
@@ -263,8 +263,8 @@
         </p:nvSpPr>
         <p:spPr>
           <a:xfrm>
-            <a:off x="2852280" y="224280"/>
-            <a:ext cx="2873520" cy="5355720"/>
+            <a:off x="2924280" y="224280"/>
+            <a:ext cx="2872800" cy="5355000"/>
           </a:xfrm>
           <a:prstGeom prst="rect">
             <a:avLst/>
@@ -443,8 +443,8 @@
         </p:nvSpPr>
         <p:spPr>
           <a:xfrm>
-            <a:off x="112680" y="224280"/>
-            <a:ext cx="2406600" cy="2923920"/>
+            <a:off x="256680" y="224280"/>
+            <a:ext cx="2405880" cy="2923200"/>
           </a:xfrm>
           <a:prstGeom prst="rect">
             <a:avLst/>
@@ -555,7 +555,7 @@
         <p:spPr>
           <a:xfrm>
             <a:off x="112680" y="3495960"/>
-            <a:ext cx="2652840" cy="2497320"/>
+            <a:ext cx="2652120" cy="3164040"/>
           </a:xfrm>
           <a:prstGeom prst="rect">
             <a:avLst/>
@@ -636,7 +636,31 @@
                 </a:solidFill>
                 <a:latin typeface="Calibri"/>
               </a:rPr>
-              <a:t>vectorField</a:t>
+              <a:t>VectorField</a:t>
+            </a:r>
+            <a:endParaRPr/>
+          </a:p>
+          <a:p>
+            <a:r>
+              <a:rPr lang="pt-BR" sz="2800">
+                <a:solidFill>
+                  <a:srgbClr val="000000"/>
+                </a:solidFill>
+                <a:latin typeface="Calibri"/>
+              </a:rPr>
+              <a:t>Growth</a:t>
+            </a:r>
+            <a:endParaRPr/>
+          </a:p>
+          <a:p>
+            <a:r>
+              <a:rPr lang="pt-BR" sz="2800">
+                <a:solidFill>
+                  <a:srgbClr val="000000"/>
+                </a:solidFill>
+                <a:latin typeface="Calibri"/>
+              </a:rPr>
+              <a:t>Anim</a:t>
             </a:r>
             <a:endParaRPr/>
           </a:p>
@@ -653,8 +677,8 @@
         </p:nvSpPr>
         <p:spPr>
           <a:xfrm>
-            <a:off x="5925960" y="224280"/>
-            <a:ext cx="2868840" cy="4630320"/>
+            <a:off x="5997960" y="224280"/>
+            <a:ext cx="2868120" cy="4629600"/>
           </a:xfrm>
           <a:prstGeom prst="rect">
             <a:avLst/>
@@ -771,7 +795,7 @@
                 </a:solidFill>
                 <a:latin typeface="Calibri"/>
               </a:rPr>
-              <a:t>readParFile</a:t>
+              <a:t>Parameters</a:t>
             </a:r>
             <a:endParaRPr/>
           </a:p>
@@ -800,8 +824,8 @@
         </p:nvSpPr>
         <p:spPr>
           <a:xfrm>
-            <a:off x="3060000" y="5976000"/>
-            <a:ext cx="2406600" cy="790920"/>
+            <a:off x="3132000" y="5832000"/>
+            <a:ext cx="2405880" cy="790200"/>
           </a:xfrm>
           <a:prstGeom prst="rect">
             <a:avLst/>
@@ -852,7 +876,7 @@
         <p:spPr>
           <a:xfrm>
             <a:off x="6053040" y="5040000"/>
-            <a:ext cx="2406600" cy="1644120"/>
+            <a:ext cx="2405880" cy="1643400"/>
           </a:xfrm>
           <a:prstGeom prst="rect">
             <a:avLst/>

</xml_diff>

<commit_message>
Removed temporary file and globals variables in main.h. Created fileManager files.
</commit_message>
<xml_diff>
--- a/doc/mclone-sw-structure.pptx
+++ b/doc/mclone-sw-structure.pptx
@@ -60,7 +60,7 @@
         <p:spPr>
           <a:xfrm>
             <a:off x="3124080" y="6356520"/>
-            <a:ext cx="2894040" cy="363600"/>
+            <a:ext cx="2893680" cy="363240"/>
           </a:xfrm>
           <a:prstGeom prst="rect">
             <a:avLst/>
@@ -264,7 +264,7 @@
         <p:spPr>
           <a:xfrm>
             <a:off x="2924280" y="224280"/>
-            <a:ext cx="2872800" cy="5355000"/>
+            <a:ext cx="2872440" cy="5354640"/>
           </a:xfrm>
           <a:prstGeom prst="rect">
             <a:avLst/>
@@ -309,7 +309,7 @@
                 </a:solidFill>
                 <a:latin typeface="Calibri"/>
               </a:rPr>
-              <a:t>distpoints</a:t>
+              <a:t>distPoints</a:t>
             </a:r>
             <a:endParaRPr/>
           </a:p>
@@ -444,7 +444,7 @@
         <p:spPr>
           <a:xfrm>
             <a:off x="256680" y="224280"/>
-            <a:ext cx="2405880" cy="2923200"/>
+            <a:ext cx="2405520" cy="2922840"/>
           </a:xfrm>
           <a:prstGeom prst="rect">
             <a:avLst/>
@@ -555,7 +555,7 @@
         <p:spPr>
           <a:xfrm>
             <a:off x="112680" y="3495960"/>
-            <a:ext cx="2652120" cy="3164040"/>
+            <a:ext cx="2651760" cy="3163680"/>
           </a:xfrm>
           <a:prstGeom prst="rect">
             <a:avLst/>
@@ -678,7 +678,7 @@
         <p:spPr>
           <a:xfrm>
             <a:off x="5997960" y="224280"/>
-            <a:ext cx="2868120" cy="4629600"/>
+            <a:ext cx="2867760" cy="4095720"/>
           </a:xfrm>
           <a:prstGeom prst="rect">
             <a:avLst/>
@@ -735,7 +735,7 @@
                 </a:solidFill>
                 <a:latin typeface="Calibri"/>
               </a:rPr>
-              <a:t>list</a:t>
+              <a:t>cellsList</a:t>
             </a:r>
             <a:endParaRPr/>
           </a:p>
@@ -767,23 +767,23 @@
             <a:r>
               <a:rPr lang="pt-BR" sz="2800">
                 <a:solidFill>
-                  <a:srgbClr val="ff0000"/>
-                </a:solidFill>
-                <a:latin typeface="Calibri"/>
-              </a:rPr>
-              <a:t>point3D</a:t>
-            </a:r>
-            <a:endParaRPr/>
-          </a:p>
-          <a:p>
-            <a:r>
-              <a:rPr lang="pt-BR" sz="2800">
-                <a:solidFill>
-                  <a:srgbClr val="ff0000"/>
-                </a:solidFill>
-                <a:latin typeface="Calibri"/>
-              </a:rPr>
-              <a:t>matrix4</a:t>
+                  <a:srgbClr val="000000"/>
+                </a:solidFill>
+                <a:latin typeface="Calibri"/>
+              </a:rPr>
+              <a:t>Point3D</a:t>
+            </a:r>
+            <a:endParaRPr/>
+          </a:p>
+          <a:p>
+            <a:r>
+              <a:rPr lang="pt-BR" sz="2800">
+                <a:solidFill>
+                  <a:srgbClr val="000000"/>
+                </a:solidFill>
+                <a:latin typeface="Calibri"/>
+              </a:rPr>
+              <a:t>Matrix4</a:t>
             </a:r>
             <a:endParaRPr/>
           </a:p>
@@ -803,15 +803,12 @@
             <a:r>
               <a:rPr lang="pt-BR" sz="2800">
                 <a:solidFill>
-                  <a:srgbClr val="ff0000"/>
+                  <a:srgbClr val="000000"/>
                 </a:solidFill>
                 <a:latin typeface="Calibri"/>
               </a:rPr>
               <a:t>fileManager</a:t>
             </a:r>
-            <a:endParaRPr/>
-          </a:p>
-          <a:p>
             <a:endParaRPr/>
           </a:p>
         </p:txBody>
@@ -825,7 +822,7 @@
         <p:spPr>
           <a:xfrm>
             <a:off x="3132000" y="5832000"/>
-            <a:ext cx="2405880" cy="790200"/>
+            <a:ext cx="2405520" cy="789840"/>
           </a:xfrm>
           <a:prstGeom prst="rect">
             <a:avLst/>
@@ -876,7 +873,7 @@
         <p:spPr>
           <a:xfrm>
             <a:off x="6053040" y="5040000"/>
-            <a:ext cx="2405880" cy="1643400"/>
+            <a:ext cx="2405520" cy="1643040"/>
           </a:xfrm>
           <a:prstGeom prst="rect">
             <a:avLst/>

</xml_diff>